<commit_message>
add free y-axis figure option
@NidhiVinod , choose your preference

Co-Authored-By: Valentine Herrmann <19673377+ValentineHerr@users.noreply.github.com>
</commit_message>
<xml_diff>
--- a/tree_rings/draft_tree-rings_fig.pptx
+++ b/tree_rings/draft_tree-rings_fig.pptx
@@ -6,6 +6,7 @@
   </p:sldMasterIdLst>
   <p:sldIdLst>
     <p:sldId id="256" r:id="rId2"/>
+    <p:sldId id="257" r:id="rId3"/>
   </p:sldIdLst>
   <p:sldSz cx="12192000" cy="6858000"/>
   <p:notesSz cx="6858000" cy="9144000"/>
@@ -3673,6 +3674,371 @@
 </p:sld>
 </file>
 
+<file path=ppt/slides/slide2.xml><?xml version="1.0" encoding="utf-8"?>
+<p:sld xmlns:a="http://schemas.openxmlformats.org/drawingml/2006/main" xmlns:r="http://schemas.openxmlformats.org/officeDocument/2006/relationships" xmlns:p="http://schemas.openxmlformats.org/presentationml/2006/main">
+  <p:cSld>
+    <p:spTree>
+      <p:nvGrpSpPr>
+        <p:cNvPr id="1" name=""/>
+        <p:cNvGrpSpPr/>
+        <p:nvPr/>
+      </p:nvGrpSpPr>
+      <p:grpSpPr>
+        <a:xfrm>
+          <a:off x="0" y="0"/>
+          <a:ext cx="0" cy="0"/>
+          <a:chOff x="0" y="0"/>
+          <a:chExt cx="0" cy="0"/>
+        </a:xfrm>
+      </p:grpSpPr>
+      <p:pic>
+        <p:nvPicPr>
+          <p:cNvPr id="3" name="Picture 2">
+            <a:extLst>
+              <a:ext uri="{FF2B5EF4-FFF2-40B4-BE49-F238E27FC236}">
+                <a16:creationId xmlns:a16="http://schemas.microsoft.com/office/drawing/2014/main" id="{9DD44164-D76B-0B4A-94C0-9B134805C476}"/>
+              </a:ext>
+            </a:extLst>
+          </p:cNvPr>
+          <p:cNvPicPr>
+            <a:picLocks noChangeAspect="1"/>
+          </p:cNvPicPr>
+          <p:nvPr/>
+        </p:nvPicPr>
+        <p:blipFill>
+          <a:blip r:embed="rId2"/>
+          <a:stretch>
+            <a:fillRect/>
+          </a:stretch>
+        </p:blipFill>
+        <p:spPr>
+          <a:xfrm>
+            <a:off x="3200076" y="332737"/>
+            <a:ext cx="2989990" cy="6073417"/>
+          </a:xfrm>
+          <a:prstGeom prst="rect">
+            <a:avLst/>
+          </a:prstGeom>
+        </p:spPr>
+      </p:pic>
+      <p:pic>
+        <p:nvPicPr>
+          <p:cNvPr id="7" name="Picture 6">
+            <a:extLst>
+              <a:ext uri="{FF2B5EF4-FFF2-40B4-BE49-F238E27FC236}">
+                <a16:creationId xmlns:a16="http://schemas.microsoft.com/office/drawing/2014/main" id="{3312E9D9-3EB4-C043-9025-BC9CACAC40FF}"/>
+              </a:ext>
+            </a:extLst>
+          </p:cNvPr>
+          <p:cNvPicPr>
+            <a:picLocks noChangeAspect="1"/>
+          </p:cNvPicPr>
+          <p:nvPr/>
+        </p:nvPicPr>
+        <p:blipFill rotWithShape="1">
+          <a:blip r:embed="rId3"/>
+          <a:srcRect l="26594" t="-36" r="21318" b="94374"/>
+          <a:stretch/>
+        </p:blipFill>
+        <p:spPr>
+          <a:xfrm>
+            <a:off x="6454053" y="359522"/>
+            <a:ext cx="2176515" cy="208981"/>
+          </a:xfrm>
+          <a:prstGeom prst="rect">
+            <a:avLst/>
+          </a:prstGeom>
+        </p:spPr>
+      </p:pic>
+      <p:grpSp>
+        <p:nvGrpSpPr>
+          <p:cNvPr id="8" name="Group 7">
+            <a:extLst>
+              <a:ext uri="{FF2B5EF4-FFF2-40B4-BE49-F238E27FC236}">
+                <a16:creationId xmlns:a16="http://schemas.microsoft.com/office/drawing/2014/main" id="{C1176BA4-62AC-2D47-85C1-E5FF80191872}"/>
+              </a:ext>
+            </a:extLst>
+          </p:cNvPr>
+          <p:cNvGrpSpPr/>
+          <p:nvPr/>
+        </p:nvGrpSpPr>
+        <p:grpSpPr>
+          <a:xfrm>
+            <a:off x="6249095" y="672680"/>
+            <a:ext cx="2426606" cy="5808062"/>
+            <a:chOff x="6123578" y="713163"/>
+            <a:chExt cx="2426606" cy="5808062"/>
+          </a:xfrm>
+        </p:grpSpPr>
+        <p:pic>
+          <p:nvPicPr>
+            <p:cNvPr id="6" name="Picture 5">
+              <a:extLst>
+                <a:ext uri="{FF2B5EF4-FFF2-40B4-BE49-F238E27FC236}">
+                  <a16:creationId xmlns:a16="http://schemas.microsoft.com/office/drawing/2014/main" id="{53BA53F9-4AF6-884F-8FC7-081B84DF87D4}"/>
+                </a:ext>
+              </a:extLst>
+            </p:cNvPr>
+            <p:cNvPicPr>
+              <a:picLocks noChangeAspect="1"/>
+            </p:cNvPicPr>
+            <p:nvPr/>
+          </p:nvPicPr>
+          <p:blipFill rotWithShape="1">
+            <a:blip r:embed="rId3"/>
+            <a:srcRect l="3567" t="6017" r="61271"/>
+            <a:stretch/>
+          </p:blipFill>
+          <p:spPr>
+            <a:xfrm>
+              <a:off x="6123578" y="713163"/>
+              <a:ext cx="2426606" cy="5808062"/>
+            </a:xfrm>
+            <a:prstGeom prst="rect">
+              <a:avLst/>
+            </a:prstGeom>
+          </p:spPr>
+        </p:pic>
+        <p:sp>
+          <p:nvSpPr>
+            <p:cNvPr id="2" name="TextBox 1">
+              <a:extLst>
+                <a:ext uri="{FF2B5EF4-FFF2-40B4-BE49-F238E27FC236}">
+                  <a16:creationId xmlns:a16="http://schemas.microsoft.com/office/drawing/2014/main" id="{4FBFDD4E-8513-694A-BCB4-AD12C6322002}"/>
+                </a:ext>
+              </a:extLst>
+            </p:cNvPr>
+            <p:cNvSpPr txBox="1"/>
+            <p:nvPr/>
+          </p:nvSpPr>
+          <p:spPr>
+            <a:xfrm>
+              <a:off x="6989379" y="777770"/>
+              <a:ext cx="1446021" cy="261610"/>
+            </a:xfrm>
+            <a:prstGeom prst="rect">
+              <a:avLst/>
+            </a:prstGeom>
+            <a:noFill/>
+          </p:spPr>
+          <p:txBody>
+            <a:bodyPr wrap="square" rtlCol="0">
+              <a:spAutoFit/>
+            </a:bodyPr>
+            <a:lstStyle/>
+            <a:p>
+              <a:pPr algn="r"/>
+              <a:r>
+                <a:rPr lang="en-US" sz="1100" i="1" dirty="0">
+                  <a:latin typeface="Arial" panose="020B0604020202020204" pitchFamily="34" charset="0"/>
+                  <a:cs typeface="Arial" panose="020B0604020202020204" pitchFamily="34" charset="0"/>
+                </a:rPr>
+                <a:t>Tsuga canadensis</a:t>
+              </a:r>
+            </a:p>
+          </p:txBody>
+        </p:sp>
+        <p:sp>
+          <p:nvSpPr>
+            <p:cNvPr id="16" name="TextBox 15">
+              <a:extLst>
+                <a:ext uri="{FF2B5EF4-FFF2-40B4-BE49-F238E27FC236}">
+                  <a16:creationId xmlns:a16="http://schemas.microsoft.com/office/drawing/2014/main" id="{81F23270-6692-3F4E-93E5-6989ADD857FD}"/>
+                </a:ext>
+              </a:extLst>
+            </p:cNvPr>
+            <p:cNvSpPr txBox="1"/>
+            <p:nvPr/>
+          </p:nvSpPr>
+          <p:spPr>
+            <a:xfrm>
+              <a:off x="6989379" y="2107328"/>
+              <a:ext cx="1446021" cy="261610"/>
+            </a:xfrm>
+            <a:prstGeom prst="rect">
+              <a:avLst/>
+            </a:prstGeom>
+            <a:noFill/>
+          </p:spPr>
+          <p:txBody>
+            <a:bodyPr wrap="square" rtlCol="0">
+              <a:spAutoFit/>
+            </a:bodyPr>
+            <a:lstStyle/>
+            <a:p>
+              <a:pPr algn="r"/>
+              <a:r>
+                <a:rPr lang="en-US" sz="1100" i="1" dirty="0">
+                  <a:latin typeface="Arial" panose="020B0604020202020204" pitchFamily="34" charset="0"/>
+                  <a:cs typeface="Arial" panose="020B0604020202020204" pitchFamily="34" charset="0"/>
+                </a:rPr>
+                <a:t>Fagus grandifolia</a:t>
+              </a:r>
+            </a:p>
+          </p:txBody>
+        </p:sp>
+        <p:sp>
+          <p:nvSpPr>
+            <p:cNvPr id="17" name="TextBox 16">
+              <a:extLst>
+                <a:ext uri="{FF2B5EF4-FFF2-40B4-BE49-F238E27FC236}">
+                  <a16:creationId xmlns:a16="http://schemas.microsoft.com/office/drawing/2014/main" id="{1D3816CB-FBFE-AA4F-BEE8-EEE47292B5D1}"/>
+                </a:ext>
+              </a:extLst>
+            </p:cNvPr>
+            <p:cNvSpPr txBox="1"/>
+            <p:nvPr/>
+          </p:nvSpPr>
+          <p:spPr>
+            <a:xfrm>
+              <a:off x="6989379" y="3466576"/>
+              <a:ext cx="1446021" cy="261610"/>
+            </a:xfrm>
+            <a:prstGeom prst="rect">
+              <a:avLst/>
+            </a:prstGeom>
+            <a:noFill/>
+          </p:spPr>
+          <p:txBody>
+            <a:bodyPr wrap="square" rtlCol="0">
+              <a:spAutoFit/>
+            </a:bodyPr>
+            <a:lstStyle/>
+            <a:p>
+              <a:pPr algn="r"/>
+              <a:r>
+                <a:rPr lang="en-US" sz="1100" i="1" dirty="0">
+                  <a:latin typeface="Arial" panose="020B0604020202020204" pitchFamily="34" charset="0"/>
+                  <a:cs typeface="Arial" panose="020B0604020202020204" pitchFamily="34" charset="0"/>
+                </a:rPr>
+                <a:t>Acer rubrum</a:t>
+              </a:r>
+            </a:p>
+          </p:txBody>
+        </p:sp>
+        <p:sp>
+          <p:nvSpPr>
+            <p:cNvPr id="18" name="TextBox 17">
+              <a:extLst>
+                <a:ext uri="{FF2B5EF4-FFF2-40B4-BE49-F238E27FC236}">
+                  <a16:creationId xmlns:a16="http://schemas.microsoft.com/office/drawing/2014/main" id="{9B0C520C-E8A7-F64C-B823-9158DECF0163}"/>
+                </a:ext>
+              </a:extLst>
+            </p:cNvPr>
+            <p:cNvSpPr txBox="1"/>
+            <p:nvPr/>
+          </p:nvSpPr>
+          <p:spPr>
+            <a:xfrm>
+              <a:off x="6989379" y="4804804"/>
+              <a:ext cx="1446021" cy="261610"/>
+            </a:xfrm>
+            <a:prstGeom prst="rect">
+              <a:avLst/>
+            </a:prstGeom>
+            <a:noFill/>
+          </p:spPr>
+          <p:txBody>
+            <a:bodyPr wrap="square" rtlCol="0">
+              <a:spAutoFit/>
+            </a:bodyPr>
+            <a:lstStyle/>
+            <a:p>
+              <a:pPr algn="r"/>
+              <a:r>
+                <a:rPr lang="en-US" sz="1100" i="1" dirty="0">
+                  <a:latin typeface="Arial" panose="020B0604020202020204" pitchFamily="34" charset="0"/>
+                  <a:cs typeface="Arial" panose="020B0604020202020204" pitchFamily="34" charset="0"/>
+                </a:rPr>
+                <a:t>Quercus rubra</a:t>
+              </a:r>
+            </a:p>
+          </p:txBody>
+        </p:sp>
+      </p:grpSp>
+      <p:sp>
+        <p:nvSpPr>
+          <p:cNvPr id="9" name="TextBox 8">
+            <a:extLst>
+              <a:ext uri="{FF2B5EF4-FFF2-40B4-BE49-F238E27FC236}">
+                <a16:creationId xmlns:a16="http://schemas.microsoft.com/office/drawing/2014/main" id="{B0827302-ED15-364A-8A71-CC8F545A9A0E}"/>
+              </a:ext>
+            </a:extLst>
+          </p:cNvPr>
+          <p:cNvSpPr txBox="1"/>
+          <p:nvPr/>
+        </p:nvSpPr>
+        <p:spPr>
+          <a:xfrm>
+            <a:off x="3076490" y="332738"/>
+            <a:ext cx="585627" cy="369332"/>
+          </a:xfrm>
+          <a:prstGeom prst="rect">
+            <a:avLst/>
+          </a:prstGeom>
+          <a:noFill/>
+        </p:spPr>
+        <p:txBody>
+          <a:bodyPr wrap="square" rtlCol="0">
+            <a:spAutoFit/>
+          </a:bodyPr>
+          <a:lstStyle/>
+          <a:p>
+            <a:r>
+              <a:rPr lang="en-US" dirty="0"/>
+              <a:t>(a)</a:t>
+            </a:r>
+          </a:p>
+        </p:txBody>
+      </p:sp>
+      <p:sp>
+        <p:nvSpPr>
+          <p:cNvPr id="10" name="TextBox 9">
+            <a:extLst>
+              <a:ext uri="{FF2B5EF4-FFF2-40B4-BE49-F238E27FC236}">
+                <a16:creationId xmlns:a16="http://schemas.microsoft.com/office/drawing/2014/main" id="{0646AA13-0A84-AA43-B437-D822EA3680E2}"/>
+              </a:ext>
+            </a:extLst>
+          </p:cNvPr>
+          <p:cNvSpPr txBox="1"/>
+          <p:nvPr/>
+        </p:nvSpPr>
+        <p:spPr>
+          <a:xfrm>
+            <a:off x="6103905" y="332738"/>
+            <a:ext cx="585627" cy="369332"/>
+          </a:xfrm>
+          <a:prstGeom prst="rect">
+            <a:avLst/>
+          </a:prstGeom>
+          <a:noFill/>
+        </p:spPr>
+        <p:txBody>
+          <a:bodyPr wrap="square" rtlCol="0">
+            <a:spAutoFit/>
+          </a:bodyPr>
+          <a:lstStyle/>
+          <a:p>
+            <a:r>
+              <a:rPr lang="en-US" dirty="0"/>
+              <a:t>(b)</a:t>
+            </a:r>
+          </a:p>
+        </p:txBody>
+      </p:sp>
+    </p:spTree>
+    <p:extLst>
+      <p:ext uri="{BB962C8B-B14F-4D97-AF65-F5344CB8AC3E}">
+        <p14:creationId xmlns:p14="http://schemas.microsoft.com/office/powerpoint/2010/main" val="260477423"/>
+      </p:ext>
+    </p:extLst>
+  </p:cSld>
+  <p:clrMapOvr>
+    <a:masterClrMapping/>
+  </p:clrMapOvr>
+</p:sld>
+</file>
+
 <file path=ppt/theme/theme1.xml><?xml version="1.0" encoding="utf-8"?>
 <a:theme xmlns:a="http://schemas.openxmlformats.org/drawingml/2006/main" name="Office Theme">
   <a:themeElements>

</xml_diff>